<commit_message>
Site updated: 2020-01-27 10:35:37
</commit_message>
<xml_diff>
--- a/2020/01/21/Kafka实现吞吐量大的原因/演示文稿1.pptx
+++ b/2020/01/21/Kafka实现吞吐量大的原因/演示文稿1.pptx
@@ -6,6 +6,7 @@
   </p:sldMasterIdLst>
   <p:sldIdLst>
     <p:sldId id="256" r:id="rId2"/>
+    <p:sldId id="257" r:id="rId3"/>
   </p:sldIdLst>
   <p:sldSz cx="12192000" cy="6858000"/>
   <p:notesSz cx="6858000" cy="9144000"/>
@@ -4862,6 +4863,781 @@
 </p:sld>
 </file>
 
+<file path=ppt/slides/slide2.xml><?xml version="1.0" encoding="utf-8"?>
+<p:sld xmlns:a="http://schemas.openxmlformats.org/drawingml/2006/main" xmlns:r="http://schemas.openxmlformats.org/officeDocument/2006/relationships" xmlns:p="http://schemas.openxmlformats.org/presentationml/2006/main">
+  <p:cSld>
+    <p:bg>
+      <p:bgPr>
+        <a:solidFill>
+          <a:schemeClr val="bg1">
+            <a:lumMod val="75000"/>
+          </a:schemeClr>
+        </a:solidFill>
+        <a:effectLst/>
+      </p:bgPr>
+    </p:bg>
+    <p:spTree>
+      <p:nvGrpSpPr>
+        <p:cNvPr id="1" name=""/>
+        <p:cNvGrpSpPr/>
+        <p:nvPr/>
+      </p:nvGrpSpPr>
+      <p:grpSpPr>
+        <a:xfrm>
+          <a:off x="0" y="0"/>
+          <a:ext cx="0" cy="0"/>
+          <a:chOff x="0" y="0"/>
+          <a:chExt cx="0" cy="0"/>
+        </a:xfrm>
+      </p:grpSpPr>
+      <p:sp>
+        <p:nvSpPr>
+          <p:cNvPr id="4" name="流程图: 磁盘 3">
+            <a:extLst>
+              <a:ext uri="{FF2B5EF4-FFF2-40B4-BE49-F238E27FC236}">
+                <a16:creationId xmlns:a16="http://schemas.microsoft.com/office/drawing/2014/main" id="{4046B6F0-816D-4997-8B50-4FB1EEE5C3C4}"/>
+              </a:ext>
+            </a:extLst>
+          </p:cNvPr>
+          <p:cNvSpPr/>
+          <p:nvPr/>
+        </p:nvSpPr>
+        <p:spPr>
+          <a:xfrm>
+            <a:off x="4371975" y="5334000"/>
+            <a:ext cx="2847975" cy="1028700"/>
+          </a:xfrm>
+          <a:prstGeom prst="flowChartMagneticDisk">
+            <a:avLst/>
+          </a:prstGeom>
+        </p:spPr>
+        <p:style>
+          <a:lnRef idx="2">
+            <a:schemeClr val="accent1">
+              <a:shade val="50000"/>
+            </a:schemeClr>
+          </a:lnRef>
+          <a:fillRef idx="1">
+            <a:schemeClr val="accent1"/>
+          </a:fillRef>
+          <a:effectRef idx="0">
+            <a:schemeClr val="accent1"/>
+          </a:effectRef>
+          <a:fontRef idx="minor">
+            <a:schemeClr val="lt1"/>
+          </a:fontRef>
+        </p:style>
+        <p:txBody>
+          <a:bodyPr rtlCol="0" anchor="ctr"/>
+          <a:lstStyle/>
+          <a:p>
+            <a:pPr algn="ctr"/>
+            <a:r>
+              <a:rPr lang="zh-CN" altLang="en-US" dirty="0"/>
+              <a:t>磁盘数据</a:t>
+            </a:r>
+          </a:p>
+        </p:txBody>
+      </p:sp>
+      <p:sp>
+        <p:nvSpPr>
+          <p:cNvPr id="5" name="矩形: 圆角 4">
+            <a:extLst>
+              <a:ext uri="{FF2B5EF4-FFF2-40B4-BE49-F238E27FC236}">
+                <a16:creationId xmlns:a16="http://schemas.microsoft.com/office/drawing/2014/main" id="{17D75A11-34DB-48E5-A5BE-73E26F97325F}"/>
+              </a:ext>
+            </a:extLst>
+          </p:cNvPr>
+          <p:cNvSpPr/>
+          <p:nvPr/>
+        </p:nvSpPr>
+        <p:spPr>
+          <a:xfrm>
+            <a:off x="1743075" y="1266825"/>
+            <a:ext cx="4792717" cy="2743200"/>
+          </a:xfrm>
+          <a:prstGeom prst="roundRect">
+            <a:avLst/>
+          </a:prstGeom>
+        </p:spPr>
+        <p:style>
+          <a:lnRef idx="2">
+            <a:schemeClr val="accent2">
+              <a:shade val="50000"/>
+            </a:schemeClr>
+          </a:lnRef>
+          <a:fillRef idx="1">
+            <a:schemeClr val="accent2"/>
+          </a:fillRef>
+          <a:effectRef idx="0">
+            <a:schemeClr val="accent2"/>
+          </a:effectRef>
+          <a:fontRef idx="minor">
+            <a:schemeClr val="lt1"/>
+          </a:fontRef>
+        </p:style>
+        <p:txBody>
+          <a:bodyPr rtlCol="0" anchor="ctr"/>
+          <a:lstStyle/>
+          <a:p>
+            <a:pPr algn="ctr"/>
+            <a:r>
+              <a:rPr lang="zh-CN" altLang="en-US" dirty="0"/>
+              <a:t>内存</a:t>
+            </a:r>
+          </a:p>
+        </p:txBody>
+      </p:sp>
+      <p:sp>
+        <p:nvSpPr>
+          <p:cNvPr id="6" name="矩形: 圆角 5">
+            <a:extLst>
+              <a:ext uri="{FF2B5EF4-FFF2-40B4-BE49-F238E27FC236}">
+                <a16:creationId xmlns:a16="http://schemas.microsoft.com/office/drawing/2014/main" id="{B37646B0-643C-4A26-A886-34691AFAA7B9}"/>
+              </a:ext>
+            </a:extLst>
+          </p:cNvPr>
+          <p:cNvSpPr/>
+          <p:nvPr/>
+        </p:nvSpPr>
+        <p:spPr>
+          <a:xfrm>
+            <a:off x="2111395" y="2905111"/>
+            <a:ext cx="1733550" cy="942975"/>
+          </a:xfrm>
+          <a:prstGeom prst="roundRect">
+            <a:avLst/>
+          </a:prstGeom>
+        </p:spPr>
+        <p:style>
+          <a:lnRef idx="2">
+            <a:schemeClr val="accent4">
+              <a:shade val="50000"/>
+            </a:schemeClr>
+          </a:lnRef>
+          <a:fillRef idx="1">
+            <a:schemeClr val="accent4"/>
+          </a:fillRef>
+          <a:effectRef idx="0">
+            <a:schemeClr val="accent4"/>
+          </a:effectRef>
+          <a:fontRef idx="minor">
+            <a:schemeClr val="lt1"/>
+          </a:fontRef>
+        </p:style>
+        <p:txBody>
+          <a:bodyPr rtlCol="0" anchor="ctr"/>
+          <a:lstStyle/>
+          <a:p>
+            <a:pPr algn="ctr"/>
+            <a:r>
+              <a:rPr lang="zh-CN" altLang="en-US" dirty="0"/>
+              <a:t>操作系统内核空间</a:t>
+            </a:r>
+          </a:p>
+        </p:txBody>
+      </p:sp>
+      <p:sp>
+        <p:nvSpPr>
+          <p:cNvPr id="9" name="矩形: 圆角 8">
+            <a:extLst>
+              <a:ext uri="{FF2B5EF4-FFF2-40B4-BE49-F238E27FC236}">
+                <a16:creationId xmlns:a16="http://schemas.microsoft.com/office/drawing/2014/main" id="{21F7F877-E1DF-4153-965B-1DFDFB41123E}"/>
+              </a:ext>
+            </a:extLst>
+          </p:cNvPr>
+          <p:cNvSpPr/>
+          <p:nvPr/>
+        </p:nvSpPr>
+        <p:spPr>
+          <a:xfrm>
+            <a:off x="2443552" y="1285646"/>
+            <a:ext cx="1733550" cy="942975"/>
+          </a:xfrm>
+          <a:prstGeom prst="roundRect">
+            <a:avLst/>
+          </a:prstGeom>
+        </p:spPr>
+        <p:style>
+          <a:lnRef idx="2">
+            <a:schemeClr val="accent6">
+              <a:shade val="50000"/>
+            </a:schemeClr>
+          </a:lnRef>
+          <a:fillRef idx="1">
+            <a:schemeClr val="accent6"/>
+          </a:fillRef>
+          <a:effectRef idx="0">
+            <a:schemeClr val="accent6"/>
+          </a:effectRef>
+          <a:fontRef idx="minor">
+            <a:schemeClr val="lt1"/>
+          </a:fontRef>
+        </p:style>
+        <p:txBody>
+          <a:bodyPr rtlCol="0" anchor="ctr"/>
+          <a:lstStyle/>
+          <a:p>
+            <a:pPr algn="ctr"/>
+            <a:r>
+              <a:rPr lang="zh-CN" altLang="en-US" dirty="0"/>
+              <a:t>应用程序内存空间</a:t>
+            </a:r>
+          </a:p>
+        </p:txBody>
+      </p:sp>
+      <p:sp>
+        <p:nvSpPr>
+          <p:cNvPr id="10" name="矩形: 圆角 9">
+            <a:extLst>
+              <a:ext uri="{FF2B5EF4-FFF2-40B4-BE49-F238E27FC236}">
+                <a16:creationId xmlns:a16="http://schemas.microsoft.com/office/drawing/2014/main" id="{5BE7AFAE-A347-45AD-BE6C-818EAB36437E}"/>
+              </a:ext>
+            </a:extLst>
+          </p:cNvPr>
+          <p:cNvSpPr/>
+          <p:nvPr/>
+        </p:nvSpPr>
+        <p:spPr>
+          <a:xfrm>
+            <a:off x="8334375" y="466725"/>
+            <a:ext cx="2876550" cy="1409700"/>
+          </a:xfrm>
+          <a:prstGeom prst="roundRect">
+            <a:avLst/>
+          </a:prstGeom>
+        </p:spPr>
+        <p:style>
+          <a:lnRef idx="1">
+            <a:schemeClr val="accent2"/>
+          </a:lnRef>
+          <a:fillRef idx="2">
+            <a:schemeClr val="accent2"/>
+          </a:fillRef>
+          <a:effectRef idx="1">
+            <a:schemeClr val="accent2"/>
+          </a:effectRef>
+          <a:fontRef idx="minor">
+            <a:schemeClr val="dk1"/>
+          </a:fontRef>
+        </p:style>
+        <p:txBody>
+          <a:bodyPr rtlCol="0" anchor="ctr"/>
+          <a:lstStyle/>
+          <a:p>
+            <a:pPr algn="ctr"/>
+            <a:r>
+              <a:rPr lang="zh-CN" altLang="en-US" dirty="0"/>
+              <a:t>网卡</a:t>
+            </a:r>
+          </a:p>
+        </p:txBody>
+      </p:sp>
+      <p:sp>
+        <p:nvSpPr>
+          <p:cNvPr id="11" name="箭头: 下 10">
+            <a:extLst>
+              <a:ext uri="{FF2B5EF4-FFF2-40B4-BE49-F238E27FC236}">
+                <a16:creationId xmlns:a16="http://schemas.microsoft.com/office/drawing/2014/main" id="{6A43E574-FE90-4B4A-BC86-69A4F9C40655}"/>
+              </a:ext>
+            </a:extLst>
+          </p:cNvPr>
+          <p:cNvSpPr/>
+          <p:nvPr/>
+        </p:nvSpPr>
+        <p:spPr>
+          <a:xfrm rot="8162168">
+            <a:off x="4154948" y="3545746"/>
+            <a:ext cx="464241" cy="1881347"/>
+          </a:xfrm>
+          <a:prstGeom prst="downArrow">
+            <a:avLst/>
+          </a:prstGeom>
+        </p:spPr>
+        <p:style>
+          <a:lnRef idx="2">
+            <a:schemeClr val="accent4">
+              <a:shade val="50000"/>
+            </a:schemeClr>
+          </a:lnRef>
+          <a:fillRef idx="1">
+            <a:schemeClr val="accent4"/>
+          </a:fillRef>
+          <a:effectRef idx="0">
+            <a:schemeClr val="accent4"/>
+          </a:effectRef>
+          <a:fontRef idx="minor">
+            <a:schemeClr val="lt1"/>
+          </a:fontRef>
+        </p:style>
+        <p:txBody>
+          <a:bodyPr rtlCol="0" anchor="ctr"/>
+          <a:lstStyle/>
+          <a:p>
+            <a:pPr algn="ctr"/>
+            <a:endParaRPr lang="zh-CN" altLang="en-US"/>
+          </a:p>
+        </p:txBody>
+      </p:sp>
+      <p:sp>
+        <p:nvSpPr>
+          <p:cNvPr id="12" name="箭头: 下 11">
+            <a:extLst>
+              <a:ext uri="{FF2B5EF4-FFF2-40B4-BE49-F238E27FC236}">
+                <a16:creationId xmlns:a16="http://schemas.microsoft.com/office/drawing/2014/main" id="{E6AFBB42-0D10-493F-9DCC-8B7C44307791}"/>
+              </a:ext>
+            </a:extLst>
+          </p:cNvPr>
+          <p:cNvSpPr/>
+          <p:nvPr/>
+        </p:nvSpPr>
+        <p:spPr>
+          <a:xfrm rot="11309548">
+            <a:off x="2757946" y="2315966"/>
+            <a:ext cx="440447" cy="468973"/>
+          </a:xfrm>
+          <a:prstGeom prst="downArrow">
+            <a:avLst/>
+          </a:prstGeom>
+        </p:spPr>
+        <p:style>
+          <a:lnRef idx="2">
+            <a:schemeClr val="accent6">
+              <a:shade val="50000"/>
+            </a:schemeClr>
+          </a:lnRef>
+          <a:fillRef idx="1">
+            <a:schemeClr val="accent6"/>
+          </a:fillRef>
+          <a:effectRef idx="0">
+            <a:schemeClr val="accent6"/>
+          </a:effectRef>
+          <a:fontRef idx="minor">
+            <a:schemeClr val="lt1"/>
+          </a:fontRef>
+        </p:style>
+        <p:txBody>
+          <a:bodyPr rtlCol="0" anchor="ctr"/>
+          <a:lstStyle/>
+          <a:p>
+            <a:pPr algn="ctr"/>
+            <a:endParaRPr lang="zh-CN" altLang="en-US"/>
+          </a:p>
+        </p:txBody>
+      </p:sp>
+      <p:sp>
+        <p:nvSpPr>
+          <p:cNvPr id="13" name="箭头: 下 12">
+            <a:extLst>
+              <a:ext uri="{FF2B5EF4-FFF2-40B4-BE49-F238E27FC236}">
+                <a16:creationId xmlns:a16="http://schemas.microsoft.com/office/drawing/2014/main" id="{D1BF54C0-4404-436D-A647-7862A7DD2A13}"/>
+              </a:ext>
+            </a:extLst>
+          </p:cNvPr>
+          <p:cNvSpPr/>
+          <p:nvPr/>
+        </p:nvSpPr>
+        <p:spPr>
+          <a:xfrm rot="15087955">
+            <a:off x="7045637" y="504677"/>
+            <a:ext cx="486890" cy="1974155"/>
+          </a:xfrm>
+          <a:prstGeom prst="downArrow">
+            <a:avLst/>
+          </a:prstGeom>
+        </p:spPr>
+        <p:style>
+          <a:lnRef idx="1">
+            <a:schemeClr val="accent2"/>
+          </a:lnRef>
+          <a:fillRef idx="2">
+            <a:schemeClr val="accent2"/>
+          </a:fillRef>
+          <a:effectRef idx="1">
+            <a:schemeClr val="accent2"/>
+          </a:effectRef>
+          <a:fontRef idx="minor">
+            <a:schemeClr val="dk1"/>
+          </a:fontRef>
+        </p:style>
+        <p:txBody>
+          <a:bodyPr rtlCol="0" anchor="ctr"/>
+          <a:lstStyle/>
+          <a:p>
+            <a:pPr algn="ctr"/>
+            <a:endParaRPr lang="zh-CN" altLang="en-US"/>
+          </a:p>
+        </p:txBody>
+      </p:sp>
+      <p:sp>
+        <p:nvSpPr>
+          <p:cNvPr id="15" name="箭头: 下 14">
+            <a:extLst>
+              <a:ext uri="{FF2B5EF4-FFF2-40B4-BE49-F238E27FC236}">
+                <a16:creationId xmlns:a16="http://schemas.microsoft.com/office/drawing/2014/main" id="{30B9B9C1-E8B7-4256-A42E-76236588279B}"/>
+              </a:ext>
+            </a:extLst>
+          </p:cNvPr>
+          <p:cNvSpPr/>
+          <p:nvPr/>
+        </p:nvSpPr>
+        <p:spPr>
+          <a:xfrm rot="15006540">
+            <a:off x="6180681" y="576432"/>
+            <a:ext cx="486890" cy="3896538"/>
+          </a:xfrm>
+          <a:prstGeom prst="downArrow">
+            <a:avLst/>
+          </a:prstGeom>
+        </p:spPr>
+        <p:style>
+          <a:lnRef idx="2">
+            <a:schemeClr val="accent1">
+              <a:shade val="50000"/>
+            </a:schemeClr>
+          </a:lnRef>
+          <a:fillRef idx="1">
+            <a:schemeClr val="accent1"/>
+          </a:fillRef>
+          <a:effectRef idx="0">
+            <a:schemeClr val="accent1"/>
+          </a:effectRef>
+          <a:fontRef idx="minor">
+            <a:schemeClr val="lt1"/>
+          </a:fontRef>
+        </p:style>
+        <p:txBody>
+          <a:bodyPr rtlCol="0" anchor="ctr"/>
+          <a:lstStyle/>
+          <a:p>
+            <a:pPr algn="ctr"/>
+            <a:endParaRPr lang="zh-CN" altLang="en-US"/>
+          </a:p>
+        </p:txBody>
+      </p:sp>
+      <p:sp>
+        <p:nvSpPr>
+          <p:cNvPr id="17" name="文本框 16">
+            <a:extLst>
+              <a:ext uri="{FF2B5EF4-FFF2-40B4-BE49-F238E27FC236}">
+                <a16:creationId xmlns:a16="http://schemas.microsoft.com/office/drawing/2014/main" id="{4BE6FF94-CDCC-412A-ADC4-5B861314335C}"/>
+              </a:ext>
+            </a:extLst>
+          </p:cNvPr>
+          <p:cNvSpPr txBox="1"/>
+          <p:nvPr/>
+        </p:nvSpPr>
+        <p:spPr>
+          <a:xfrm>
+            <a:off x="2362407" y="4629121"/>
+            <a:ext cx="2492990" cy="369332"/>
+          </a:xfrm>
+          <a:prstGeom prst="rect">
+            <a:avLst/>
+          </a:prstGeom>
+          <a:noFill/>
+        </p:spPr>
+        <p:txBody>
+          <a:bodyPr wrap="none" rtlCol="0">
+            <a:spAutoFit/>
+          </a:bodyPr>
+          <a:lstStyle/>
+          <a:p>
+            <a:r>
+              <a:rPr lang="zh-CN" altLang="en-US" dirty="0"/>
+              <a:t>传统拷贝方式步骤繁琐</a:t>
+            </a:r>
+          </a:p>
+        </p:txBody>
+      </p:sp>
+      <p:sp>
+        <p:nvSpPr>
+          <p:cNvPr id="18" name="文本框 17">
+            <a:extLst>
+              <a:ext uri="{FF2B5EF4-FFF2-40B4-BE49-F238E27FC236}">
+                <a16:creationId xmlns:a16="http://schemas.microsoft.com/office/drawing/2014/main" id="{89371F9B-9A4C-4CB2-A8D7-E4FA0F1EFB65}"/>
+              </a:ext>
+            </a:extLst>
+          </p:cNvPr>
+          <p:cNvSpPr txBox="1"/>
+          <p:nvPr/>
+        </p:nvSpPr>
+        <p:spPr>
+          <a:xfrm>
+            <a:off x="5196964" y="4122128"/>
+            <a:ext cx="1338828" cy="369332"/>
+          </a:xfrm>
+          <a:prstGeom prst="rect">
+            <a:avLst/>
+          </a:prstGeom>
+          <a:noFill/>
+        </p:spPr>
+        <p:txBody>
+          <a:bodyPr wrap="none" rtlCol="0">
+            <a:spAutoFit/>
+          </a:bodyPr>
+          <a:lstStyle/>
+          <a:p>
+            <a:r>
+              <a:rPr lang="en-US" altLang="zh-CN" dirty="0"/>
+              <a:t>Zero</a:t>
+            </a:r>
+            <a:r>
+              <a:rPr lang="zh-CN" altLang="en-US" dirty="0"/>
+              <a:t>零拷贝</a:t>
+            </a:r>
+          </a:p>
+        </p:txBody>
+      </p:sp>
+      <p:sp>
+        <p:nvSpPr>
+          <p:cNvPr id="19" name="箭头: 下 18">
+            <a:extLst>
+              <a:ext uri="{FF2B5EF4-FFF2-40B4-BE49-F238E27FC236}">
+                <a16:creationId xmlns:a16="http://schemas.microsoft.com/office/drawing/2014/main" id="{A4669A08-E2AD-41AE-8CBA-B61C4C0E9BA3}"/>
+              </a:ext>
+            </a:extLst>
+          </p:cNvPr>
+          <p:cNvSpPr/>
+          <p:nvPr/>
+        </p:nvSpPr>
+        <p:spPr>
+          <a:xfrm rot="7958982">
+            <a:off x="4687660" y="3321833"/>
+            <a:ext cx="486890" cy="2108565"/>
+          </a:xfrm>
+          <a:prstGeom prst="downArrow">
+            <a:avLst/>
+          </a:prstGeom>
+        </p:spPr>
+        <p:style>
+          <a:lnRef idx="2">
+            <a:schemeClr val="accent1">
+              <a:shade val="50000"/>
+            </a:schemeClr>
+          </a:lnRef>
+          <a:fillRef idx="1">
+            <a:schemeClr val="accent1"/>
+          </a:fillRef>
+          <a:effectRef idx="0">
+            <a:schemeClr val="accent1"/>
+          </a:effectRef>
+          <a:fontRef idx="minor">
+            <a:schemeClr val="lt1"/>
+          </a:fontRef>
+        </p:style>
+        <p:txBody>
+          <a:bodyPr rtlCol="0" anchor="ctr"/>
+          <a:lstStyle/>
+          <a:p>
+            <a:pPr algn="ctr"/>
+            <a:endParaRPr lang="zh-CN" altLang="en-US"/>
+          </a:p>
+        </p:txBody>
+      </p:sp>
+      <p:sp>
+        <p:nvSpPr>
+          <p:cNvPr id="20" name="矩形 19">
+            <a:extLst>
+              <a:ext uri="{FF2B5EF4-FFF2-40B4-BE49-F238E27FC236}">
+                <a16:creationId xmlns:a16="http://schemas.microsoft.com/office/drawing/2014/main" id="{16E39446-3385-42CB-94DC-B351B729429D}"/>
+              </a:ext>
+            </a:extLst>
+          </p:cNvPr>
+          <p:cNvSpPr/>
+          <p:nvPr/>
+        </p:nvSpPr>
+        <p:spPr>
+          <a:xfrm>
+            <a:off x="10372725" y="4844549"/>
+            <a:ext cx="1409700" cy="274053"/>
+          </a:xfrm>
+          <a:prstGeom prst="rect">
+            <a:avLst/>
+          </a:prstGeom>
+        </p:spPr>
+        <p:style>
+          <a:lnRef idx="2">
+            <a:schemeClr val="accent1">
+              <a:shade val="50000"/>
+            </a:schemeClr>
+          </a:lnRef>
+          <a:fillRef idx="1">
+            <a:schemeClr val="accent1"/>
+          </a:fillRef>
+          <a:effectRef idx="0">
+            <a:schemeClr val="accent1"/>
+          </a:effectRef>
+          <a:fontRef idx="minor">
+            <a:schemeClr val="lt1"/>
+          </a:fontRef>
+        </p:style>
+        <p:txBody>
+          <a:bodyPr rtlCol="0" anchor="ctr"/>
+          <a:lstStyle/>
+          <a:p>
+            <a:pPr algn="ctr"/>
+            <a:r>
+              <a:rPr lang="zh-CN" altLang="en-US" dirty="0"/>
+              <a:t>零拷贝</a:t>
+            </a:r>
+          </a:p>
+        </p:txBody>
+      </p:sp>
+      <p:sp>
+        <p:nvSpPr>
+          <p:cNvPr id="21" name="矩形 20">
+            <a:extLst>
+              <a:ext uri="{FF2B5EF4-FFF2-40B4-BE49-F238E27FC236}">
+                <a16:creationId xmlns:a16="http://schemas.microsoft.com/office/drawing/2014/main" id="{9714D8F7-144C-4341-8D33-F98C1A311ED5}"/>
+              </a:ext>
+            </a:extLst>
+          </p:cNvPr>
+          <p:cNvSpPr/>
+          <p:nvPr/>
+        </p:nvSpPr>
+        <p:spPr>
+          <a:xfrm>
+            <a:off x="10372725" y="5432929"/>
+            <a:ext cx="1409700" cy="274053"/>
+          </a:xfrm>
+          <a:prstGeom prst="rect">
+            <a:avLst/>
+          </a:prstGeom>
+        </p:spPr>
+        <p:style>
+          <a:lnRef idx="2">
+            <a:schemeClr val="accent3">
+              <a:shade val="50000"/>
+            </a:schemeClr>
+          </a:lnRef>
+          <a:fillRef idx="1">
+            <a:schemeClr val="accent3"/>
+          </a:fillRef>
+          <a:effectRef idx="0">
+            <a:schemeClr val="accent3"/>
+          </a:effectRef>
+          <a:fontRef idx="minor">
+            <a:schemeClr val="lt1"/>
+          </a:fontRef>
+        </p:style>
+        <p:txBody>
+          <a:bodyPr rtlCol="0" anchor="ctr"/>
+          <a:lstStyle/>
+          <a:p>
+            <a:pPr algn="ctr"/>
+            <a:r>
+              <a:rPr lang="zh-CN" altLang="en-US" dirty="0"/>
+              <a:t>其他</a:t>
+            </a:r>
+          </a:p>
+        </p:txBody>
+      </p:sp>
+      <p:sp>
+        <p:nvSpPr>
+          <p:cNvPr id="22" name="流程图: 直接访问存储器 21">
+            <a:extLst>
+              <a:ext uri="{FF2B5EF4-FFF2-40B4-BE49-F238E27FC236}">
+                <a16:creationId xmlns:a16="http://schemas.microsoft.com/office/drawing/2014/main" id="{5C0CC1C6-3C07-4432-AD1B-5EFA33A5D535}"/>
+              </a:ext>
+            </a:extLst>
+          </p:cNvPr>
+          <p:cNvSpPr/>
+          <p:nvPr/>
+        </p:nvSpPr>
+        <p:spPr>
+          <a:xfrm>
+            <a:off x="4793231" y="1597725"/>
+            <a:ext cx="1686517" cy="466195"/>
+          </a:xfrm>
+          <a:prstGeom prst="flowChartMagneticDrum">
+            <a:avLst/>
+          </a:prstGeom>
+        </p:spPr>
+        <p:style>
+          <a:lnRef idx="1">
+            <a:schemeClr val="accent6"/>
+          </a:lnRef>
+          <a:fillRef idx="2">
+            <a:schemeClr val="accent6"/>
+          </a:fillRef>
+          <a:effectRef idx="1">
+            <a:schemeClr val="accent6"/>
+          </a:effectRef>
+          <a:fontRef idx="minor">
+            <a:schemeClr val="dk1"/>
+          </a:fontRef>
+        </p:style>
+        <p:txBody>
+          <a:bodyPr rtlCol="0" anchor="ctr"/>
+          <a:lstStyle/>
+          <a:p>
+            <a:pPr algn="ctr"/>
+            <a:r>
+              <a:rPr lang="en-US" altLang="zh-CN" dirty="0"/>
+              <a:t>Socket</a:t>
+            </a:r>
+            <a:endParaRPr lang="zh-CN" altLang="en-US" dirty="0"/>
+          </a:p>
+        </p:txBody>
+      </p:sp>
+      <p:sp>
+        <p:nvSpPr>
+          <p:cNvPr id="23" name="箭头: 右 22">
+            <a:extLst>
+              <a:ext uri="{FF2B5EF4-FFF2-40B4-BE49-F238E27FC236}">
+                <a16:creationId xmlns:a16="http://schemas.microsoft.com/office/drawing/2014/main" id="{AF11559B-6163-404B-B1EC-71C155077C69}"/>
+              </a:ext>
+            </a:extLst>
+          </p:cNvPr>
+          <p:cNvSpPr/>
+          <p:nvPr/>
+        </p:nvSpPr>
+        <p:spPr>
+          <a:xfrm>
+            <a:off x="4221291" y="1701962"/>
+            <a:ext cx="535296" cy="260188"/>
+          </a:xfrm>
+          <a:prstGeom prst="rightArrow">
+            <a:avLst/>
+          </a:prstGeom>
+        </p:spPr>
+        <p:style>
+          <a:lnRef idx="1">
+            <a:schemeClr val="accent6"/>
+          </a:lnRef>
+          <a:fillRef idx="2">
+            <a:schemeClr val="accent6"/>
+          </a:fillRef>
+          <a:effectRef idx="1">
+            <a:schemeClr val="accent6"/>
+          </a:effectRef>
+          <a:fontRef idx="minor">
+            <a:schemeClr val="dk1"/>
+          </a:fontRef>
+        </p:style>
+        <p:txBody>
+          <a:bodyPr rtlCol="0" anchor="ctr"/>
+          <a:lstStyle/>
+          <a:p>
+            <a:pPr algn="ctr"/>
+            <a:endParaRPr lang="zh-CN" altLang="en-US"/>
+          </a:p>
+        </p:txBody>
+      </p:sp>
+    </p:spTree>
+    <p:extLst>
+      <p:ext uri="{BB962C8B-B14F-4D97-AF65-F5344CB8AC3E}">
+        <p14:creationId xmlns:p14="http://schemas.microsoft.com/office/powerpoint/2010/main" val="4155230289"/>
+      </p:ext>
+    </p:extLst>
+  </p:cSld>
+  <p:clrMapOvr>
+    <a:masterClrMapping/>
+  </p:clrMapOvr>
+</p:sld>
+</file>
+
 <file path=ppt/theme/theme1.xml><?xml version="1.0" encoding="utf-8"?>
 <a:theme xmlns:a="http://schemas.openxmlformats.org/drawingml/2006/main" name="Office 主题​​">
   <a:themeElements>

</xml_diff>